<commit_message>
add page-rank.pptx, edit random-walks.pptx
</commit_message>
<xml_diff>
--- a/fall13/slidesF13/random-walks.pptx
+++ b/fall13/slidesF13/random-walks.pptx
@@ -2954,41 +2954,6 @@
       </p:sp>
       <p:sp>
         <p:nvSpPr>
-          <p:cNvPr id="4" name="Date Placeholder 3"/>
-          <p:cNvSpPr>
-            <a:spLocks noGrp="1"/>
-          </p:cNvSpPr>
-          <p:nvPr>
-            <p:ph type="dt" sz="half" idx="10"/>
-          </p:nvPr>
-        </p:nvSpPr>
-        <p:spPr>
-          <a:xfrm>
-            <a:off x="3124200" y="6553200"/>
-            <a:ext cx="2863850" cy="228600"/>
-          </a:xfrm>
-        </p:spPr>
-        <p:txBody>
-          <a:bodyPr/>
-          <a:lstStyle>
-            <a:lvl1pPr>
-              <a:defRPr/>
-            </a:lvl1pPr>
-          </a:lstStyle>
-          <a:p>
-            <a:pPr>
-              <a:defRPr/>
-            </a:pPr>
-            <a:r>
-              <a:rPr lang="en-US" dirty="0" smtClean="0"/>
-              <a:t>May 16, 2012</a:t>
-            </a:r>
-            <a:endParaRPr lang="en-US" dirty="0"/>
-          </a:p>
-        </p:txBody>
-      </p:sp>
-      <p:sp>
-        <p:nvSpPr>
           <p:cNvPr id="6" name="Slide Number Placeholder 5"/>
           <p:cNvSpPr>
             <a:spLocks noGrp="1"/>
@@ -3026,6 +2991,59 @@
             <a:pPr>
               <a:defRPr/>
             </a:pPr>
+            <a:endParaRPr lang="en-US" dirty="0"/>
+          </a:p>
+        </p:txBody>
+      </p:sp>
+      <p:sp>
+        <p:nvSpPr>
+          <p:cNvPr id="7" name="Rectangle 4"/>
+          <p:cNvSpPr>
+            <a:spLocks noGrp="1" noChangeArrowheads="1"/>
+          </p:cNvSpPr>
+          <p:nvPr>
+            <p:ph type="dt" sz="half" idx="2"/>
+          </p:nvPr>
+        </p:nvSpPr>
+        <p:spPr bwMode="auto">
+          <a:xfrm>
+            <a:off x="3124200" y="6629400"/>
+            <a:ext cx="2863850" cy="228600"/>
+          </a:xfrm>
+          <a:prstGeom prst="rect">
+            <a:avLst/>
+          </a:prstGeom>
+          <a:noFill/>
+          <a:ln w="9525">
+            <a:noFill/>
+            <a:miter lim="800000"/>
+            <a:headEnd/>
+            <a:tailEnd/>
+          </a:ln>
+        </p:spPr>
+        <p:txBody>
+          <a:bodyPr vert="horz" wrap="square" lIns="91440" tIns="45720" rIns="91440" bIns="45720" numCol="1" anchor="t" anchorCtr="0" compatLnSpc="1">
+            <a:prstTxWarp prst="textNoShape">
+              <a:avLst/>
+            </a:prstTxWarp>
+          </a:bodyPr>
+          <a:lstStyle>
+            <a:lvl1pPr algn="ctr" eaLnBrk="1" hangingPunct="1">
+              <a:defRPr sz="1000">
+                <a:latin typeface="Comic Sans MS" pitchFamily="-64" charset="0"/>
+                <a:ea typeface="ＭＳ Ｐゴシック" pitchFamily="-64" charset="-128"/>
+                <a:cs typeface="+mn-cs"/>
+              </a:defRPr>
+            </a:lvl1pPr>
+          </a:lstStyle>
+          <a:p>
+            <a:pPr>
+              <a:defRPr/>
+            </a:pPr>
+            <a:r>
+              <a:rPr lang="en-US" dirty="0" smtClean="0"/>
+              <a:t>Albert R Meyer,           December 11, 2013</a:t>
+            </a:r>
             <a:endParaRPr lang="en-US" dirty="0"/>
           </a:p>
         </p:txBody>
@@ -3132,36 +3150,6 @@
       </p:sp>
       <p:sp>
         <p:nvSpPr>
-          <p:cNvPr id="4" name="Date Placeholder 3"/>
-          <p:cNvSpPr>
-            <a:spLocks noGrp="1"/>
-          </p:cNvSpPr>
-          <p:nvPr>
-            <p:ph type="dt" sz="half" idx="10"/>
-          </p:nvPr>
-        </p:nvSpPr>
-        <p:spPr/>
-        <p:txBody>
-          <a:bodyPr/>
-          <a:lstStyle>
-            <a:lvl1pPr>
-              <a:defRPr/>
-            </a:lvl1pPr>
-          </a:lstStyle>
-          <a:p>
-            <a:pPr>
-              <a:defRPr/>
-            </a:pPr>
-            <a:r>
-              <a:rPr lang="en-US" dirty="0" smtClean="0"/>
-              <a:t>May 11, 2010</a:t>
-            </a:r>
-            <a:endParaRPr lang="en-US" dirty="0"/>
-          </a:p>
-        </p:txBody>
-      </p:sp>
-      <p:sp>
-        <p:nvSpPr>
           <p:cNvPr id="6" name="Slide Number Placeholder 5"/>
           <p:cNvSpPr>
             <a:spLocks noGrp="1"/>
@@ -3199,6 +3187,59 @@
             <a:pPr>
               <a:defRPr/>
             </a:pPr>
+            <a:endParaRPr lang="en-US" dirty="0"/>
+          </a:p>
+        </p:txBody>
+      </p:sp>
+      <p:sp>
+        <p:nvSpPr>
+          <p:cNvPr id="7" name="Rectangle 4"/>
+          <p:cNvSpPr>
+            <a:spLocks noGrp="1" noChangeArrowheads="1"/>
+          </p:cNvSpPr>
+          <p:nvPr>
+            <p:ph type="dt" sz="half" idx="2"/>
+          </p:nvPr>
+        </p:nvSpPr>
+        <p:spPr bwMode="auto">
+          <a:xfrm>
+            <a:off x="3124200" y="6629400"/>
+            <a:ext cx="2863850" cy="228600"/>
+          </a:xfrm>
+          <a:prstGeom prst="rect">
+            <a:avLst/>
+          </a:prstGeom>
+          <a:noFill/>
+          <a:ln w="9525">
+            <a:noFill/>
+            <a:miter lim="800000"/>
+            <a:headEnd/>
+            <a:tailEnd/>
+          </a:ln>
+        </p:spPr>
+        <p:txBody>
+          <a:bodyPr vert="horz" wrap="square" lIns="91440" tIns="45720" rIns="91440" bIns="45720" numCol="1" anchor="t" anchorCtr="0" compatLnSpc="1">
+            <a:prstTxWarp prst="textNoShape">
+              <a:avLst/>
+            </a:prstTxWarp>
+          </a:bodyPr>
+          <a:lstStyle>
+            <a:lvl1pPr algn="ctr" eaLnBrk="1" hangingPunct="1">
+              <a:defRPr sz="1000">
+                <a:latin typeface="Comic Sans MS" pitchFamily="-64" charset="0"/>
+                <a:ea typeface="ＭＳ Ｐゴシック" pitchFamily="-64" charset="-128"/>
+                <a:cs typeface="+mn-cs"/>
+              </a:defRPr>
+            </a:lvl1pPr>
+          </a:lstStyle>
+          <a:p>
+            <a:pPr>
+              <a:defRPr/>
+            </a:pPr>
+            <a:r>
+              <a:rPr lang="en-US" dirty="0" smtClean="0"/>
+              <a:t>Albert R Meyer,           December 11, 2013</a:t>
+            </a:r>
             <a:endParaRPr lang="en-US" dirty="0"/>
           </a:p>
         </p:txBody>
@@ -3327,36 +3368,6 @@
       </p:sp>
       <p:sp>
         <p:nvSpPr>
-          <p:cNvPr id="4" name="Date Placeholder 3"/>
-          <p:cNvSpPr>
-            <a:spLocks noGrp="1"/>
-          </p:cNvSpPr>
-          <p:nvPr>
-            <p:ph type="dt" sz="half" idx="10"/>
-          </p:nvPr>
-        </p:nvSpPr>
-        <p:spPr/>
-        <p:txBody>
-          <a:bodyPr/>
-          <a:lstStyle>
-            <a:lvl1pPr>
-              <a:defRPr/>
-            </a:lvl1pPr>
-          </a:lstStyle>
-          <a:p>
-            <a:pPr>
-              <a:defRPr/>
-            </a:pPr>
-            <a:r>
-              <a:rPr lang="en-US" dirty="0" smtClean="0"/>
-              <a:t>May 11, 2010</a:t>
-            </a:r>
-            <a:endParaRPr lang="en-US" dirty="0"/>
-          </a:p>
-        </p:txBody>
-      </p:sp>
-      <p:sp>
-        <p:nvSpPr>
           <p:cNvPr id="6" name="Slide Number Placeholder 5"/>
           <p:cNvSpPr>
             <a:spLocks noGrp="1"/>
@@ -3394,6 +3405,59 @@
             <a:pPr>
               <a:defRPr/>
             </a:pPr>
+            <a:endParaRPr lang="en-US" dirty="0"/>
+          </a:p>
+        </p:txBody>
+      </p:sp>
+      <p:sp>
+        <p:nvSpPr>
+          <p:cNvPr id="7" name="Rectangle 4"/>
+          <p:cNvSpPr>
+            <a:spLocks noGrp="1" noChangeArrowheads="1"/>
+          </p:cNvSpPr>
+          <p:nvPr>
+            <p:ph type="dt" sz="half" idx="2"/>
+          </p:nvPr>
+        </p:nvSpPr>
+        <p:spPr bwMode="auto">
+          <a:xfrm>
+            <a:off x="3124200" y="6629400"/>
+            <a:ext cx="2863850" cy="228600"/>
+          </a:xfrm>
+          <a:prstGeom prst="rect">
+            <a:avLst/>
+          </a:prstGeom>
+          <a:noFill/>
+          <a:ln w="9525">
+            <a:noFill/>
+            <a:miter lim="800000"/>
+            <a:headEnd/>
+            <a:tailEnd/>
+          </a:ln>
+        </p:spPr>
+        <p:txBody>
+          <a:bodyPr vert="horz" wrap="square" lIns="91440" tIns="45720" rIns="91440" bIns="45720" numCol="1" anchor="t" anchorCtr="0" compatLnSpc="1">
+            <a:prstTxWarp prst="textNoShape">
+              <a:avLst/>
+            </a:prstTxWarp>
+          </a:bodyPr>
+          <a:lstStyle>
+            <a:lvl1pPr algn="ctr" eaLnBrk="1" hangingPunct="1">
+              <a:defRPr sz="1000">
+                <a:latin typeface="Comic Sans MS" pitchFamily="-64" charset="0"/>
+                <a:ea typeface="ＭＳ Ｐゴシック" pitchFamily="-64" charset="-128"/>
+                <a:cs typeface="+mn-cs"/>
+              </a:defRPr>
+            </a:lvl1pPr>
+          </a:lstStyle>
+          <a:p>
+            <a:pPr>
+              <a:defRPr/>
+            </a:pPr>
+            <a:r>
+              <a:rPr lang="en-US" dirty="0" smtClean="0"/>
+              <a:t>Albert R Meyer,           December 11, 2013</a:t>
+            </a:r>
             <a:endParaRPr lang="en-US" dirty="0"/>
           </a:p>
         </p:txBody>
@@ -3448,36 +3512,6 @@
       </p:sp>
       <p:sp>
         <p:nvSpPr>
-          <p:cNvPr id="3" name="Date Placeholder 2"/>
-          <p:cNvSpPr>
-            <a:spLocks noGrp="1"/>
-          </p:cNvSpPr>
-          <p:nvPr>
-            <p:ph type="dt" sz="half" idx="10"/>
-          </p:nvPr>
-        </p:nvSpPr>
-        <p:spPr/>
-        <p:txBody>
-          <a:bodyPr/>
-          <a:lstStyle>
-            <a:lvl1pPr>
-              <a:defRPr/>
-            </a:lvl1pPr>
-          </a:lstStyle>
-          <a:p>
-            <a:pPr>
-              <a:defRPr/>
-            </a:pPr>
-            <a:r>
-              <a:rPr lang="en-US" dirty="0" smtClean="0"/>
-              <a:t>May 11, 2010</a:t>
-            </a:r>
-            <a:endParaRPr lang="en-US" dirty="0"/>
-          </a:p>
-        </p:txBody>
-      </p:sp>
-      <p:sp>
-        <p:nvSpPr>
           <p:cNvPr id="5" name="Slide Number Placeholder 4"/>
           <p:cNvSpPr>
             <a:spLocks noGrp="1"/>
@@ -3515,6 +3549,59 @@
             <a:pPr>
               <a:defRPr/>
             </a:pPr>
+            <a:endParaRPr lang="en-US" dirty="0"/>
+          </a:p>
+        </p:txBody>
+      </p:sp>
+      <p:sp>
+        <p:nvSpPr>
+          <p:cNvPr id="6" name="Rectangle 4"/>
+          <p:cNvSpPr>
+            <a:spLocks noGrp="1" noChangeArrowheads="1"/>
+          </p:cNvSpPr>
+          <p:nvPr>
+            <p:ph type="dt" sz="half" idx="2"/>
+          </p:nvPr>
+        </p:nvSpPr>
+        <p:spPr bwMode="auto">
+          <a:xfrm>
+            <a:off x="3124200" y="6629400"/>
+            <a:ext cx="2863850" cy="228600"/>
+          </a:xfrm>
+          <a:prstGeom prst="rect">
+            <a:avLst/>
+          </a:prstGeom>
+          <a:noFill/>
+          <a:ln w="9525">
+            <a:noFill/>
+            <a:miter lim="800000"/>
+            <a:headEnd/>
+            <a:tailEnd/>
+          </a:ln>
+        </p:spPr>
+        <p:txBody>
+          <a:bodyPr vert="horz" wrap="square" lIns="91440" tIns="45720" rIns="91440" bIns="45720" numCol="1" anchor="t" anchorCtr="0" compatLnSpc="1">
+            <a:prstTxWarp prst="textNoShape">
+              <a:avLst/>
+            </a:prstTxWarp>
+          </a:bodyPr>
+          <a:lstStyle>
+            <a:lvl1pPr algn="ctr" eaLnBrk="1" hangingPunct="1">
+              <a:defRPr sz="1000">
+                <a:latin typeface="Comic Sans MS" pitchFamily="-64" charset="0"/>
+                <a:ea typeface="ＭＳ Ｐゴシック" pitchFamily="-64" charset="-128"/>
+                <a:cs typeface="+mn-cs"/>
+              </a:defRPr>
+            </a:lvl1pPr>
+          </a:lstStyle>
+          <a:p>
+            <a:pPr>
+              <a:defRPr/>
+            </a:pPr>
+            <a:r>
+              <a:rPr lang="en-US" dirty="0" smtClean="0"/>
+              <a:t>Albert R Meyer,           December 11, 2013</a:t>
+            </a:r>
             <a:endParaRPr lang="en-US" dirty="0"/>
           </a:p>
         </p:txBody>
@@ -3546,36 +3633,6 @@
       </p:grpSpPr>
       <p:sp>
         <p:nvSpPr>
-          <p:cNvPr id="2" name="Date Placeholder 1"/>
-          <p:cNvSpPr>
-            <a:spLocks noGrp="1"/>
-          </p:cNvSpPr>
-          <p:nvPr>
-            <p:ph type="dt" sz="half" idx="10"/>
-          </p:nvPr>
-        </p:nvSpPr>
-        <p:spPr/>
-        <p:txBody>
-          <a:bodyPr/>
-          <a:lstStyle>
-            <a:lvl1pPr>
-              <a:defRPr/>
-            </a:lvl1pPr>
-          </a:lstStyle>
-          <a:p>
-            <a:pPr>
-              <a:defRPr/>
-            </a:pPr>
-            <a:r>
-              <a:rPr lang="en-US" dirty="0" smtClean="0"/>
-              <a:t>May 11, 2010</a:t>
-            </a:r>
-            <a:endParaRPr lang="en-US" dirty="0"/>
-          </a:p>
-        </p:txBody>
-      </p:sp>
-      <p:sp>
-        <p:nvSpPr>
           <p:cNvPr id="4" name="Slide Number Placeholder 3"/>
           <p:cNvSpPr>
             <a:spLocks noGrp="1"/>
@@ -3613,6 +3670,59 @@
             <a:pPr>
               <a:defRPr/>
             </a:pPr>
+            <a:endParaRPr lang="en-US" dirty="0"/>
+          </a:p>
+        </p:txBody>
+      </p:sp>
+      <p:sp>
+        <p:nvSpPr>
+          <p:cNvPr id="5" name="Date Placeholder 4"/>
+          <p:cNvSpPr>
+            <a:spLocks noGrp="1" noChangeArrowheads="1"/>
+          </p:cNvSpPr>
+          <p:nvPr>
+            <p:ph type="dt" sz="half" idx="2"/>
+          </p:nvPr>
+        </p:nvSpPr>
+        <p:spPr bwMode="auto">
+          <a:xfrm>
+            <a:off x="3124200" y="6629400"/>
+            <a:ext cx="2863850" cy="228600"/>
+          </a:xfrm>
+          <a:prstGeom prst="rect">
+            <a:avLst/>
+          </a:prstGeom>
+          <a:noFill/>
+          <a:ln w="9525">
+            <a:noFill/>
+            <a:miter lim="800000"/>
+            <a:headEnd/>
+            <a:tailEnd/>
+          </a:ln>
+        </p:spPr>
+        <p:txBody>
+          <a:bodyPr vert="horz" wrap="square" lIns="91440" tIns="45720" rIns="91440" bIns="45720" numCol="1" anchor="t" anchorCtr="0" compatLnSpc="1">
+            <a:prstTxWarp prst="textNoShape">
+              <a:avLst/>
+            </a:prstTxWarp>
+          </a:bodyPr>
+          <a:lstStyle>
+            <a:lvl1pPr algn="ctr" eaLnBrk="1" hangingPunct="1">
+              <a:defRPr sz="1000">
+                <a:latin typeface="Comic Sans MS" pitchFamily="-64" charset="0"/>
+                <a:ea typeface="ＭＳ Ｐゴシック" pitchFamily="-64" charset="-128"/>
+                <a:cs typeface="+mn-cs"/>
+              </a:defRPr>
+            </a:lvl1pPr>
+          </a:lstStyle>
+          <a:p>
+            <a:pPr>
+              <a:defRPr/>
+            </a:pPr>
+            <a:r>
+              <a:rPr lang="en-US" dirty="0" smtClean="0"/>
+              <a:t>Albert R Meyer,           December 11, 2013</a:t>
+            </a:r>
             <a:endParaRPr lang="en-US" dirty="0"/>
           </a:p>
         </p:txBody>
@@ -3803,36 +3913,6 @@
       </p:sp>
       <p:sp>
         <p:nvSpPr>
-          <p:cNvPr id="5" name="Date Placeholder 4"/>
-          <p:cNvSpPr>
-            <a:spLocks noGrp="1"/>
-          </p:cNvSpPr>
-          <p:nvPr>
-            <p:ph type="dt" sz="half" idx="10"/>
-          </p:nvPr>
-        </p:nvSpPr>
-        <p:spPr/>
-        <p:txBody>
-          <a:bodyPr/>
-          <a:lstStyle>
-            <a:lvl1pPr>
-              <a:defRPr/>
-            </a:lvl1pPr>
-          </a:lstStyle>
-          <a:p>
-            <a:pPr>
-              <a:defRPr/>
-            </a:pPr>
-            <a:r>
-              <a:rPr lang="en-US" dirty="0" smtClean="0"/>
-              <a:t>May 11, 2010</a:t>
-            </a:r>
-            <a:endParaRPr lang="en-US" dirty="0"/>
-          </a:p>
-        </p:txBody>
-      </p:sp>
-      <p:sp>
-        <p:nvSpPr>
           <p:cNvPr id="7" name="Slide Number Placeholder 6"/>
           <p:cNvSpPr>
             <a:spLocks noGrp="1"/>
@@ -3870,6 +3950,59 @@
             <a:pPr>
               <a:defRPr/>
             </a:pPr>
+            <a:endParaRPr lang="en-US" dirty="0"/>
+          </a:p>
+        </p:txBody>
+      </p:sp>
+      <p:sp>
+        <p:nvSpPr>
+          <p:cNvPr id="8" name="Rectangle 4"/>
+          <p:cNvSpPr>
+            <a:spLocks noGrp="1" noChangeArrowheads="1"/>
+          </p:cNvSpPr>
+          <p:nvPr>
+            <p:ph type="dt" sz="half" idx="13"/>
+          </p:nvPr>
+        </p:nvSpPr>
+        <p:spPr bwMode="auto">
+          <a:xfrm>
+            <a:off x="3124200" y="6629400"/>
+            <a:ext cx="2863850" cy="228600"/>
+          </a:xfrm>
+          <a:prstGeom prst="rect">
+            <a:avLst/>
+          </a:prstGeom>
+          <a:noFill/>
+          <a:ln w="9525">
+            <a:noFill/>
+            <a:miter lim="800000"/>
+            <a:headEnd/>
+            <a:tailEnd/>
+          </a:ln>
+        </p:spPr>
+        <p:txBody>
+          <a:bodyPr vert="horz" wrap="square" lIns="91440" tIns="45720" rIns="91440" bIns="45720" numCol="1" anchor="t" anchorCtr="0" compatLnSpc="1">
+            <a:prstTxWarp prst="textNoShape">
+              <a:avLst/>
+            </a:prstTxWarp>
+          </a:bodyPr>
+          <a:lstStyle>
+            <a:lvl1pPr algn="ctr" eaLnBrk="1" hangingPunct="1">
+              <a:defRPr sz="1000">
+                <a:latin typeface="Comic Sans MS" pitchFamily="-64" charset="0"/>
+                <a:ea typeface="ＭＳ Ｐゴシック" pitchFamily="-64" charset="-128"/>
+                <a:cs typeface="+mn-cs"/>
+              </a:defRPr>
+            </a:lvl1pPr>
+          </a:lstStyle>
+          <a:p>
+            <a:pPr>
+              <a:defRPr/>
+            </a:pPr>
+            <a:r>
+              <a:rPr lang="en-US" dirty="0" smtClean="0"/>
+              <a:t>Albert R Meyer,           December 11, 2013</a:t>
+            </a:r>
             <a:endParaRPr lang="en-US" dirty="0"/>
           </a:p>
         </p:txBody>
@@ -4802,7 +4935,7 @@
             <a:spLocks noGrp="1" noChangeArrowheads="1"/>
           </p:cNvSpPr>
           <p:nvPr>
-            <p:ph type="dt" sz="half" idx="4294967295"/>
+            <p:ph type="dt" sz="half" idx="2"/>
           </p:nvPr>
         </p:nvSpPr>
         <p:spPr bwMode="auto">
@@ -4842,7 +4975,7 @@
             </a:pPr>
             <a:r>
               <a:rPr lang="en-US" dirty="0" smtClean="0"/>
-              <a:t>Albert R Meyer,                       May 16, 2012</a:t>
+              <a:t>Albert R Meyer,        December 6, 2013</a:t>
             </a:r>
             <a:endParaRPr lang="en-US" dirty="0"/>
           </a:p>
@@ -6013,7 +6146,7 @@
             <a:spLocks noGrp="1" noChangeArrowheads="1"/>
           </p:cNvSpPr>
           <p:nvPr>
-            <p:ph type="dt" sz="half" idx="4294967295"/>
+            <p:ph type="dt" sz="half" idx="2"/>
           </p:nvPr>
         </p:nvSpPr>
         <p:spPr bwMode="auto">
@@ -6053,7 +6186,7 @@
             </a:pPr>
             <a:r>
               <a:rPr lang="en-US" dirty="0" smtClean="0"/>
-              <a:t>Albert R Meyer,                       May 16, 2012</a:t>
+              <a:t>Albert R Meyer,               December 6, 2013</a:t>
             </a:r>
             <a:endParaRPr lang="en-US" dirty="0"/>
           </a:p>
@@ -6212,7 +6345,7 @@
           <a:graphicData uri="http://schemas.openxmlformats.org/presentationml/2006/ole">
             <mc:AlternateContent xmlns:mc="http://schemas.openxmlformats.org/markup-compatibility/2006">
               <mc:Choice xmlns:v="urn:schemas-microsoft-com:vml" Requires="v">
-                <p:oleObj spid="_x0000_s100386" name="Equation" r:id="rId4" imgW="736600" imgH="533400" progId="Equation.DSMT4">
+                <p:oleObj spid="_x0000_s100391" name="Equation" r:id="rId4" imgW="736600" imgH="533400" progId="Equation.DSMT4">
                   <p:embed/>
                 </p:oleObj>
               </mc:Choice>
@@ -7783,7 +7916,7 @@
             <a:spLocks noGrp="1" noChangeArrowheads="1"/>
           </p:cNvSpPr>
           <p:nvPr>
-            <p:ph type="dt" sz="half" idx="4294967295"/>
+            <p:ph type="dt" sz="half" idx="2"/>
           </p:nvPr>
         </p:nvSpPr>
         <p:spPr bwMode="auto">
@@ -7823,7 +7956,7 @@
             </a:pPr>
             <a:r>
               <a:rPr lang="en-US" dirty="0" smtClean="0"/>
-              <a:t>Albert R Meyer,                       May 16, 2012</a:t>
+              <a:t>Albert R Meyer,               December 6, 2013</a:t>
             </a:r>
             <a:endParaRPr lang="en-US" dirty="0"/>
           </a:p>
@@ -7982,7 +8115,7 @@
           <a:graphicData uri="http://schemas.openxmlformats.org/presentationml/2006/ole">
             <mc:AlternateContent xmlns:mc="http://schemas.openxmlformats.org/markup-compatibility/2006">
               <mc:Choice xmlns:v="urn:schemas-microsoft-com:vml" Requires="v">
-                <p:oleObj spid="_x0000_s162850" name="Equation" r:id="rId4" imgW="736600" imgH="533400" progId="Equation.DSMT4">
+                <p:oleObj spid="_x0000_s162855" name="Equation" r:id="rId4" imgW="736600" imgH="533400" progId="Equation.DSMT4">
                   <p:embed/>
                 </p:oleObj>
               </mc:Choice>
@@ -10144,7 +10277,7 @@
             <a:spLocks noGrp="1" noChangeArrowheads="1"/>
           </p:cNvSpPr>
           <p:nvPr>
-            <p:ph type="dt" sz="half" idx="4294967295"/>
+            <p:ph type="dt" sz="half" idx="2"/>
           </p:nvPr>
         </p:nvSpPr>
         <p:spPr bwMode="auto">
@@ -10184,7 +10317,7 @@
             </a:pPr>
             <a:r>
               <a:rPr lang="en-US" dirty="0" smtClean="0"/>
-              <a:t>Albert R Meyer,                       May 16, 2012</a:t>
+              <a:t>Albert R Meyer,               December 6, 2013</a:t>
             </a:r>
             <a:endParaRPr lang="en-US" dirty="0"/>
           </a:p>
@@ -10206,7 +10339,7 @@
           <a:graphicData uri="http://schemas.openxmlformats.org/presentationml/2006/ole">
             <mc:AlternateContent xmlns:mc="http://schemas.openxmlformats.org/markup-compatibility/2006">
               <mc:Choice xmlns:v="urn:schemas-microsoft-com:vml" Requires="v">
-                <p:oleObj spid="_x0000_s102434" name="Equation" r:id="rId4" imgW="901700" imgH="533400" progId="Equation.DSMT4">
+                <p:oleObj spid="_x0000_s102439" name="Equation" r:id="rId4" imgW="901700" imgH="533400" progId="Equation.DSMT4">
                   <p:embed/>
                 </p:oleObj>
               </mc:Choice>
@@ -11415,7 +11548,7 @@
             <a:spLocks noGrp="1" noChangeArrowheads="1"/>
           </p:cNvSpPr>
           <p:nvPr>
-            <p:ph type="dt" sz="half" idx="4294967295"/>
+            <p:ph type="dt" sz="half" idx="2"/>
           </p:nvPr>
         </p:nvSpPr>
         <p:spPr bwMode="auto">
@@ -11455,7 +11588,7 @@
             </a:pPr>
             <a:r>
               <a:rPr lang="en-US" dirty="0" smtClean="0"/>
-              <a:t>Albert R Meyer,                       May 16, 2012</a:t>
+              <a:t>Albert R Meyer,               December 6, 2013</a:t>
             </a:r>
             <a:endParaRPr lang="en-US" dirty="0"/>
           </a:p>
@@ -11974,7 +12107,7 @@
             <a:spLocks noGrp="1" noChangeArrowheads="1"/>
           </p:cNvSpPr>
           <p:nvPr>
-            <p:ph type="dt" sz="half" idx="4294967295"/>
+            <p:ph type="dt" sz="half" idx="2"/>
           </p:nvPr>
         </p:nvSpPr>
         <p:spPr bwMode="auto">
@@ -12014,7 +12147,7 @@
             </a:pPr>
             <a:r>
               <a:rPr lang="en-US" dirty="0" smtClean="0"/>
-              <a:t>Albert R Meyer,                       May 16, 2012</a:t>
+              <a:t>Albert R Meyer,               December 6, 2013</a:t>
             </a:r>
             <a:endParaRPr lang="en-US" dirty="0"/>
           </a:p>
@@ -13639,7 +13772,7 @@
             <a:spLocks noGrp="1" noChangeArrowheads="1"/>
           </p:cNvSpPr>
           <p:nvPr>
-            <p:ph type="dt" sz="half" idx="4294967295"/>
+            <p:ph type="dt" sz="half" idx="2"/>
           </p:nvPr>
         </p:nvSpPr>
         <p:spPr bwMode="auto">
@@ -13679,7 +13812,7 @@
             </a:pPr>
             <a:r>
               <a:rPr lang="en-US" dirty="0" smtClean="0"/>
-              <a:t>Albert R Meyer,                       May 16, 2012</a:t>
+              <a:t>Albert R Meyer,               December 6, 2013</a:t>
             </a:r>
             <a:endParaRPr lang="en-US" dirty="0"/>
           </a:p>
@@ -14781,7 +14914,7 @@
             <a:spLocks noGrp="1" noChangeArrowheads="1"/>
           </p:cNvSpPr>
           <p:nvPr>
-            <p:ph type="dt" sz="half" idx="4294967295"/>
+            <p:ph type="dt" sz="half" idx="2"/>
           </p:nvPr>
         </p:nvSpPr>
         <p:spPr bwMode="auto">
@@ -14821,7 +14954,7 @@
             </a:pPr>
             <a:r>
               <a:rPr lang="en-US" dirty="0" smtClean="0"/>
-              <a:t>Albert R Meyer,                       May 16, 2012</a:t>
+              <a:t>Albert R Meyer,               December 6, 2013</a:t>
             </a:r>
             <a:endParaRPr lang="en-US" dirty="0"/>
           </a:p>
@@ -14843,7 +14976,7 @@
           <a:graphicData uri="http://schemas.openxmlformats.org/presentationml/2006/ole">
             <mc:AlternateContent xmlns:mc="http://schemas.openxmlformats.org/markup-compatibility/2006">
               <mc:Choice xmlns:v="urn:schemas-microsoft-com:vml" Requires="v">
-                <p:oleObj spid="_x0000_s114722" name="Equation" r:id="rId4" imgW="914400" imgH="533400" progId="Equation.DSMT4">
+                <p:oleObj spid="_x0000_s114727" name="Equation" r:id="rId4" imgW="914400" imgH="533400" progId="Equation.DSMT4">
                   <p:embed/>
                 </p:oleObj>
               </mc:Choice>
@@ -16147,7 +16280,7 @@
             <a:spLocks noGrp="1" noChangeArrowheads="1"/>
           </p:cNvSpPr>
           <p:nvPr>
-            <p:ph type="dt" sz="half" idx="4294967295"/>
+            <p:ph type="dt" sz="half" idx="2"/>
           </p:nvPr>
         </p:nvSpPr>
         <p:spPr bwMode="auto">
@@ -16187,7 +16320,7 @@
             </a:pPr>
             <a:r>
               <a:rPr lang="en-US" dirty="0" smtClean="0"/>
-              <a:t>Albert R Meyer,                       May 16, 2012</a:t>
+              <a:t>Albert R Meyer,               December 6, 2013</a:t>
             </a:r>
             <a:endParaRPr lang="en-US" dirty="0"/>
           </a:p>
@@ -16741,10 +16874,15 @@
             <a:spLocks noGrp="1"/>
           </p:cNvSpPr>
           <p:nvPr>
-            <p:ph type="dt" sz="half" idx="10"/>
+            <p:ph type="dt" sz="half" idx="2"/>
           </p:nvPr>
         </p:nvSpPr>
-        <p:spPr/>
+        <p:spPr>
+          <a:xfrm>
+            <a:off x="3124200" y="6629400"/>
+            <a:ext cx="2863850" cy="228600"/>
+          </a:xfrm>
+        </p:spPr>
         <p:txBody>
           <a:bodyPr/>
           <a:lstStyle/>
@@ -16753,8 +16891,8 @@
               <a:defRPr/>
             </a:pPr>
             <a:r>
-              <a:rPr lang="en-US" smtClean="0"/>
-              <a:t>May 11, 2010</a:t>
+              <a:rPr lang="en-US" dirty="0" smtClean="0"/>
+              <a:t>December 6, 2013</a:t>
             </a:r>
             <a:endParaRPr lang="en-US" dirty="0"/>
           </a:p>
@@ -19364,7 +19502,7 @@
             <a:spLocks noGrp="1" noChangeArrowheads="1"/>
           </p:cNvSpPr>
           <p:nvPr>
-            <p:ph type="dt" sz="half" idx="4294967295"/>
+            <p:ph type="dt" sz="half" idx="2"/>
           </p:nvPr>
         </p:nvSpPr>
         <p:spPr bwMode="auto">
@@ -19404,7 +19542,7 @@
             </a:pPr>
             <a:r>
               <a:rPr lang="en-US" dirty="0" smtClean="0"/>
-              <a:t>Albert R Meyer,                       May 16, 2012</a:t>
+              <a:t>Albert R Meyer,               December 6, 2013</a:t>
             </a:r>
             <a:endParaRPr lang="en-US" dirty="0"/>
           </a:p>
@@ -19707,7 +19845,7 @@
             <a:spLocks noGrp="1" noChangeArrowheads="1"/>
           </p:cNvSpPr>
           <p:nvPr>
-            <p:ph type="dt" sz="half" idx="4294967295"/>
+            <p:ph type="dt" sz="half" idx="2"/>
           </p:nvPr>
         </p:nvSpPr>
         <p:spPr bwMode="auto">
@@ -19747,7 +19885,7 @@
             </a:pPr>
             <a:r>
               <a:rPr lang="en-US" dirty="0" smtClean="0"/>
-              <a:t>Albert R Meyer,                       May 16, 2012</a:t>
+              <a:t>Albert R Meyer,               December 6, 2013</a:t>
             </a:r>
             <a:endParaRPr lang="en-US" dirty="0"/>
           </a:p>
@@ -19981,7 +20119,7 @@
 </file>
 
 <file path=ppt/slides/slide20.xml><?xml version="1.0" encoding="utf-8"?>
-<p:sld xmlns:a="http://schemas.openxmlformats.org/drawingml/2006/main" xmlns:r="http://schemas.openxmlformats.org/officeDocument/2006/relationships" xmlns:p="http://schemas.openxmlformats.org/presentationml/2006/main">
+<p:sld xmlns:a="http://schemas.openxmlformats.org/drawingml/2006/main" xmlns:r="http://schemas.openxmlformats.org/officeDocument/2006/relationships" xmlns:p="http://schemas.openxmlformats.org/presentationml/2006/main" show="0">
   <p:cSld>
     <p:spTree>
       <p:nvGrpSpPr>
@@ -20178,7 +20316,7 @@
             <a:spLocks noGrp="1" noChangeArrowheads="1"/>
           </p:cNvSpPr>
           <p:nvPr>
-            <p:ph type="dt" sz="half" idx="4294967295"/>
+            <p:ph type="dt" sz="half" idx="2"/>
           </p:nvPr>
         </p:nvSpPr>
         <p:spPr bwMode="auto">
@@ -20218,7 +20356,7 @@
             </a:pPr>
             <a:r>
               <a:rPr lang="en-US" dirty="0" smtClean="0"/>
-              <a:t>Albert R Meyer,                       May 16, 2012</a:t>
+              <a:t>Albert R Meyer,               December 6, 2013</a:t>
             </a:r>
             <a:endParaRPr lang="en-US" dirty="0"/>
           </a:p>
@@ -20424,7 +20562,7 @@
 </file>
 
 <file path=ppt/slides/slide21.xml><?xml version="1.0" encoding="utf-8"?>
-<p:sld xmlns:a="http://schemas.openxmlformats.org/drawingml/2006/main" xmlns:r="http://schemas.openxmlformats.org/officeDocument/2006/relationships" xmlns:p="http://schemas.openxmlformats.org/presentationml/2006/main">
+<p:sld xmlns:a="http://schemas.openxmlformats.org/drawingml/2006/main" xmlns:r="http://schemas.openxmlformats.org/officeDocument/2006/relationships" xmlns:p="http://schemas.openxmlformats.org/presentationml/2006/main" show="0">
   <p:cSld>
     <p:spTree>
       <p:nvGrpSpPr>
@@ -20604,7 +20742,7 @@
             <a:spLocks noGrp="1" noChangeArrowheads="1"/>
           </p:cNvSpPr>
           <p:nvPr>
-            <p:ph type="dt" sz="half" idx="4294967295"/>
+            <p:ph type="dt" sz="half" idx="2"/>
           </p:nvPr>
         </p:nvSpPr>
         <p:spPr bwMode="auto">
@@ -20644,7 +20782,7 @@
             </a:pPr>
             <a:r>
               <a:rPr lang="en-US" dirty="0" smtClean="0"/>
-              <a:t>Albert R Meyer,                       May 16, 2012</a:t>
+              <a:t>Albert R Meyer,               December 6, 2013</a:t>
             </a:r>
             <a:endParaRPr lang="en-US" dirty="0"/>
           </a:p>
@@ -20944,7 +21082,7 @@
 </file>
 
 <file path=ppt/slides/slide22.xml><?xml version="1.0" encoding="utf-8"?>
-<p:sld xmlns:a="http://schemas.openxmlformats.org/drawingml/2006/main" xmlns:r="http://schemas.openxmlformats.org/officeDocument/2006/relationships" xmlns:p="http://schemas.openxmlformats.org/presentationml/2006/main">
+<p:sld xmlns:a="http://schemas.openxmlformats.org/drawingml/2006/main" xmlns:r="http://schemas.openxmlformats.org/officeDocument/2006/relationships" xmlns:p="http://schemas.openxmlformats.org/presentationml/2006/main" show="0">
   <p:cSld>
     <p:spTree>
       <p:nvGrpSpPr>
@@ -21321,7 +21459,7 @@
             <a:spLocks noGrp="1" noChangeArrowheads="1"/>
           </p:cNvSpPr>
           <p:nvPr>
-            <p:ph type="dt" sz="half" idx="4294967295"/>
+            <p:ph type="dt" sz="half" idx="2"/>
           </p:nvPr>
         </p:nvSpPr>
         <p:spPr bwMode="auto">
@@ -21361,7 +21499,7 @@
             </a:pPr>
             <a:r>
               <a:rPr lang="en-US" dirty="0" smtClean="0"/>
-              <a:t>Albert R Meyer,                       May 16, 2012</a:t>
+              <a:t>Albert R Meyer,               December 6, 2013</a:t>
             </a:r>
             <a:endParaRPr lang="en-US" dirty="0"/>
           </a:p>
@@ -21806,7 +21944,7 @@
 </file>
 
 <file path=ppt/slides/slide23.xml><?xml version="1.0" encoding="utf-8"?>
-<p:sld xmlns:a="http://schemas.openxmlformats.org/drawingml/2006/main" xmlns:r="http://schemas.openxmlformats.org/officeDocument/2006/relationships" xmlns:p="http://schemas.openxmlformats.org/presentationml/2006/main">
+<p:sld xmlns:a="http://schemas.openxmlformats.org/drawingml/2006/main" xmlns:r="http://schemas.openxmlformats.org/officeDocument/2006/relationships" xmlns:p="http://schemas.openxmlformats.org/presentationml/2006/main" show="0">
   <p:cSld>
     <p:spTree>
       <p:nvGrpSpPr>
@@ -21936,7 +22074,7 @@
             <a:spLocks noGrp="1" noChangeArrowheads="1"/>
           </p:cNvSpPr>
           <p:nvPr>
-            <p:ph type="dt" sz="half" idx="4294967295"/>
+            <p:ph type="dt" sz="half" idx="2"/>
           </p:nvPr>
         </p:nvSpPr>
         <p:spPr bwMode="auto">
@@ -21976,7 +22114,7 @@
             </a:pPr>
             <a:r>
               <a:rPr lang="en-US" dirty="0" smtClean="0"/>
-              <a:t>Albert R Meyer,                       May 16, 2012</a:t>
+              <a:t>Albert R Meyer,               December 6, 2013</a:t>
             </a:r>
             <a:endParaRPr lang="en-US" dirty="0"/>
           </a:p>
@@ -22304,7 +22442,7 @@
 </file>
 
 <file path=ppt/slides/slide24.xml><?xml version="1.0" encoding="utf-8"?>
-<p:sld xmlns:a="http://schemas.openxmlformats.org/drawingml/2006/main" xmlns:r="http://schemas.openxmlformats.org/officeDocument/2006/relationships" xmlns:p="http://schemas.openxmlformats.org/presentationml/2006/main">
+<p:sld xmlns:a="http://schemas.openxmlformats.org/drawingml/2006/main" xmlns:r="http://schemas.openxmlformats.org/officeDocument/2006/relationships" xmlns:p="http://schemas.openxmlformats.org/presentationml/2006/main" show="0">
   <p:cSld>
     <p:spTree>
       <p:nvGrpSpPr>
@@ -22487,10 +22625,15 @@
             <a:spLocks noGrp="1"/>
           </p:cNvSpPr>
           <p:nvPr>
-            <p:ph type="dt" sz="half" idx="10"/>
+            <p:ph type="dt" sz="half" idx="2"/>
           </p:nvPr>
         </p:nvSpPr>
-        <p:spPr/>
+        <p:spPr>
+          <a:xfrm>
+            <a:off x="3124200" y="6629400"/>
+            <a:ext cx="2863850" cy="228600"/>
+          </a:xfrm>
+        </p:spPr>
         <p:txBody>
           <a:bodyPr/>
           <a:lstStyle/>
@@ -22499,8 +22642,8 @@
               <a:defRPr/>
             </a:pPr>
             <a:r>
-              <a:rPr lang="en-US" smtClean="0"/>
-              <a:t>May 11, 2010</a:t>
+              <a:rPr lang="en-US" dirty="0" smtClean="0"/>
+              <a:t>December 6, 2013</a:t>
             </a:r>
             <a:endParaRPr lang="en-US" dirty="0"/>
           </a:p>
@@ -23044,6 +23187,14 @@
   <p:clrMapOvr>
     <a:masterClrMapping/>
   </p:clrMapOvr>
+  <mc:AlternateContent xmlns:mc="http://schemas.openxmlformats.org/markup-compatibility/2006">
+    <mc:Choice xmlns:p14="http://schemas.microsoft.com/office/powerpoint/2010/main" Requires="p14">
+      <p:transition spd="slow" p14:dur="2000"/>
+    </mc:Choice>
+    <mc:Fallback>
+      <p:transition xmlns:p14="http://schemas.microsoft.com/office/powerpoint/2010/main" spd="slow"/>
+    </mc:Fallback>
+  </mc:AlternateContent>
 </p:sld>
 </file>
 
@@ -24738,7 +24889,7 @@
             <a:spLocks noGrp="1" noChangeArrowheads="1"/>
           </p:cNvSpPr>
           <p:nvPr>
-            <p:ph type="dt" sz="half" idx="4294967295"/>
+            <p:ph type="dt" sz="half" idx="2"/>
           </p:nvPr>
         </p:nvSpPr>
         <p:spPr bwMode="auto">
@@ -24778,7 +24929,7 @@
             </a:pPr>
             <a:r>
               <a:rPr lang="en-US" dirty="0" smtClean="0"/>
-              <a:t>Albert R Meyer,               May 14, 2012</a:t>
+              <a:t>Albert R Meyer,        December 6, 2013</a:t>
             </a:r>
             <a:endParaRPr lang="en-US" dirty="0"/>
           </a:p>
@@ -26188,7 +26339,7 @@
             <a:spLocks noGrp="1" noChangeArrowheads="1"/>
           </p:cNvSpPr>
           <p:nvPr>
-            <p:ph type="dt" sz="half" idx="4294967295"/>
+            <p:ph type="dt" sz="half" idx="2"/>
           </p:nvPr>
         </p:nvSpPr>
         <p:spPr bwMode="auto">
@@ -26228,7 +26379,7 @@
             </a:pPr>
             <a:r>
               <a:rPr lang="en-US" dirty="0" smtClean="0"/>
-              <a:t>Albert R Meyer,                       May 16, 2012</a:t>
+              <a:t>Albert R Meyer,               December 6, 2013</a:t>
             </a:r>
             <a:endParaRPr lang="en-US" dirty="0"/>
           </a:p>
@@ -28180,7 +28331,7 @@
             <a:spLocks noGrp="1" noChangeArrowheads="1"/>
           </p:cNvSpPr>
           <p:nvPr>
-            <p:ph type="dt" sz="half" idx="4294967295"/>
+            <p:ph type="dt" sz="half" idx="2"/>
           </p:nvPr>
         </p:nvSpPr>
         <p:spPr bwMode="auto">
@@ -28220,7 +28371,7 @@
             </a:pPr>
             <a:r>
               <a:rPr lang="en-US" dirty="0" smtClean="0"/>
-              <a:t>Albert R Meyer,                       May 16, 2012</a:t>
+              <a:t>Albert R Meyer,               December 6, 2013</a:t>
             </a:r>
             <a:endParaRPr lang="en-US" dirty="0"/>
           </a:p>
@@ -30149,7 +30300,7 @@
             <a:spLocks noGrp="1" noChangeArrowheads="1"/>
           </p:cNvSpPr>
           <p:nvPr>
-            <p:ph type="dt" sz="half" idx="4294967295"/>
+            <p:ph type="dt" sz="half" idx="2"/>
           </p:nvPr>
         </p:nvSpPr>
         <p:spPr bwMode="auto">
@@ -30189,7 +30340,7 @@
             </a:pPr>
             <a:r>
               <a:rPr lang="en-US" dirty="0" smtClean="0"/>
-              <a:t>Albert R Meyer,                       May 16, 2012</a:t>
+              <a:t>Albert R Meyer,               December 6, 2013</a:t>
             </a:r>
             <a:endParaRPr lang="en-US" dirty="0"/>
           </a:p>
@@ -30354,7 +30505,7 @@
           <a:graphicData uri="http://schemas.openxmlformats.org/presentationml/2006/ole">
             <mc:AlternateContent xmlns:mc="http://schemas.openxmlformats.org/markup-compatibility/2006">
               <mc:Choice xmlns:v="urn:schemas-microsoft-com:vml" Requires="v">
-                <p:oleObj spid="_x0000_s27682" name="Equation" r:id="rId4" imgW="736600" imgH="533400" progId="Equation.DSMT4">
+                <p:oleObj spid="_x0000_s27687" name="Equation" r:id="rId4" imgW="736600" imgH="533400" progId="Equation.DSMT4">
                   <p:embed/>
                 </p:oleObj>
               </mc:Choice>
@@ -32289,7 +32440,7 @@
             <a:spLocks noGrp="1" noChangeArrowheads="1"/>
           </p:cNvSpPr>
           <p:nvPr>
-            <p:ph type="dt" sz="half" idx="4294967295"/>
+            <p:ph type="dt" sz="half" idx="2"/>
           </p:nvPr>
         </p:nvSpPr>
         <p:spPr bwMode="auto">
@@ -32329,7 +32480,7 @@
             </a:pPr>
             <a:r>
               <a:rPr lang="en-US" dirty="0" smtClean="0"/>
-              <a:t>Albert R Meyer,                       May 16, 2012</a:t>
+              <a:t>Albert R Meyer,               December 6, 2013</a:t>
             </a:r>
             <a:endParaRPr lang="en-US" dirty="0"/>
           </a:p>
@@ -34489,7 +34640,7 @@
             <a:spLocks noGrp="1" noChangeArrowheads="1"/>
           </p:cNvSpPr>
           <p:nvPr>
-            <p:ph type="dt" sz="half" idx="4294967295"/>
+            <p:ph type="dt" sz="half" idx="2"/>
           </p:nvPr>
         </p:nvSpPr>
         <p:spPr bwMode="auto">
@@ -34529,7 +34680,7 @@
             </a:pPr>
             <a:r>
               <a:rPr lang="en-US" dirty="0" smtClean="0"/>
-              <a:t>Albert R Meyer,                       May 16, 2012</a:t>
+              <a:t>Albert R Meyer,               December 6, 2013</a:t>
             </a:r>
             <a:endParaRPr lang="en-US" dirty="0"/>
           </a:p>
@@ -35857,7 +36008,7 @@
             <a:spLocks noGrp="1" noChangeArrowheads="1"/>
           </p:cNvSpPr>
           <p:nvPr>
-            <p:ph type="dt" sz="half" idx="4294967295"/>
+            <p:ph type="dt" sz="half" idx="2"/>
           </p:nvPr>
         </p:nvSpPr>
         <p:spPr bwMode="auto">
@@ -35897,7 +36048,7 @@
             </a:pPr>
             <a:r>
               <a:rPr lang="en-US" dirty="0" smtClean="0"/>
-              <a:t>Albert R Meyer,                       May 16, 2012</a:t>
+              <a:t>Albert R Meyer,               December 6, 2013</a:t>
             </a:r>
             <a:endParaRPr lang="en-US" dirty="0"/>
           </a:p>
@@ -35919,7 +36070,7 @@
           <a:graphicData uri="http://schemas.openxmlformats.org/presentationml/2006/ole">
             <mc:AlternateContent xmlns:mc="http://schemas.openxmlformats.org/markup-compatibility/2006">
               <mc:Choice xmlns:v="urn:schemas-microsoft-com:vml" Requires="v">
-                <p:oleObj spid="_x0000_s31778" name="Equation" r:id="rId4" imgW="736600" imgH="533400" progId="Equation.DSMT4">
+                <p:oleObj spid="_x0000_s31783" name="Equation" r:id="rId4" imgW="736600" imgH="533400" progId="Equation.DSMT4">
                   <p:embed/>
                 </p:oleObj>
               </mc:Choice>

</xml_diff>

<commit_message>
edit ram walk pptx's
</commit_message>
<xml_diff>
--- a/fall13/slidesF13/random-walks.pptx
+++ b/fall13/slidesF13/random-walks.pptx
@@ -28098,10 +28098,18 @@
               <a:r>
                 <a:rPr lang="en-US" sz="1800" dirty="0" smtClean="0">
                   <a:solidFill>
+                    <a:srgbClr val="FF0000"/>
+                  </a:solidFill>
+                </a:rPr>
+                <a:t>T</a:t>
+              </a:r>
+              <a:r>
+                <a:rPr lang="en-US" sz="1800" dirty="0" smtClean="0">
+                  <a:solidFill>
                     <a:srgbClr val="008000"/>
                   </a:solidFill>
                 </a:rPr>
-                <a:t>HH</a:t>
+                <a:t>H</a:t>
               </a:r>
               <a:endParaRPr lang="en-US" sz="1800" dirty="0">
                 <a:solidFill>
@@ -28189,18 +28197,10 @@
               <a:r>
                 <a:rPr lang="en-US" sz="1800" dirty="0" smtClean="0">
                   <a:solidFill>
-                    <a:srgbClr val="008000"/>
-                  </a:solidFill>
-                </a:rPr>
-                <a:t>H</a:t>
-              </a:r>
-              <a:r>
-                <a:rPr lang="en-US" sz="1800" dirty="0" smtClean="0">
-                  <a:solidFill>
                     <a:srgbClr val="FF0000"/>
                   </a:solidFill>
                 </a:rPr>
-                <a:t>T</a:t>
+                <a:t>TT</a:t>
               </a:r>
               <a:endParaRPr lang="en-US" sz="1800" dirty="0">
                 <a:solidFill>

</xml_diff>